<commit_message>
preprocessing and modelling & non technical
</commit_message>
<xml_diff>
--- a/Mich Flu Shot Learning.pptx
+++ b/Mich Flu Shot Learning.pptx
@@ -243,7 +243,7 @@
           <a:p>
             <a:fld id="{872BFC85-49E4-447A-A7E3-16153CB2FE2A}" type="datetimeFigureOut">
               <a:rPr lang="en-US" smtClean="0"/>
-              <a:t>3/7/2025</a:t>
+              <a:t>3/8/2025</a:t>
             </a:fld>
             <a:endParaRPr lang="en-US" dirty="0"/>
           </a:p>
@@ -420,7 +420,7 @@
           <a:p>
             <a:fld id="{1071B50E-4C60-4F9E-B773-52059170945B}" type="datetimeFigureOut">
               <a:rPr lang="en-US" noProof="0" smtClean="0"/>
-              <a:t>3/7/2025</a:t>
+              <a:t>3/8/2025</a:t>
             </a:fld>
             <a:endParaRPr lang="en-US" noProof="0" dirty="0"/>
           </a:p>
@@ -16879,7 +16879,7 @@
             </a:r>
             <a:r>
               <a:rPr lang="en-US" sz="2000" dirty="0"/>
-              <a:t>0.63 Accuracy</a:t>
+              <a:t>0.62 Accuracy</a:t>
             </a:r>
           </a:p>
           <a:p>
@@ -16930,55 +16930,31 @@
               <a:buNone/>
             </a:pPr>
             <a:r>
-              <a:rPr lang="en-US" sz="2000" dirty="0"/>
-              <a:t>Logistic Regression achieved the highest accuracy at </a:t>
-            </a:r>
-            <a:r>
-              <a:rPr lang="en-US" sz="2000" b="1" dirty="0"/>
+              <a:rPr lang="en-US" sz="2200" dirty="0"/>
+              <a:t>Logistic Regression, Naive Bayes and SVM achieved the highest accuracy at </a:t>
+            </a:r>
+            <a:r>
+              <a:rPr lang="en-US" sz="2200" b="1" dirty="0"/>
               <a:t>0.63</a:t>
             </a:r>
             <a:r>
-              <a:rPr lang="en-US" sz="2000" dirty="0"/>
+              <a:rPr lang="en-US" sz="2200" dirty="0"/>
               <a:t>, making it the best-performing model. Decision Tree Classifier had the lowest accuracy at </a:t>
             </a:r>
             <a:r>
-              <a:rPr lang="en-US" sz="2000" b="1" dirty="0"/>
+              <a:rPr lang="en-US" sz="2200" b="1" dirty="0"/>
               <a:t>0.59</a:t>
             </a:r>
             <a:r>
-              <a:rPr lang="en-US" sz="2000" dirty="0"/>
-              <a:t>. Random Forest</a:t>
-            </a:r>
-            <a:r>
-              <a:rPr lang="en-US" dirty="0"/>
-              <a:t> Naive Bayes and SVM performed similarly with accuracies of </a:t>
-            </a:r>
-            <a:r>
-              <a:rPr lang="en-US" b="1" dirty="0"/>
-              <a:t>0.60</a:t>
-            </a:r>
-            <a:r>
-              <a:rPr lang="en-US" dirty="0"/>
-              <a:t>, </a:t>
-            </a:r>
-            <a:r>
-              <a:rPr lang="en-US" b="1" dirty="0"/>
+              <a:rPr lang="en-US" sz="2200" dirty="0"/>
+              <a:t>. Random Forest performed similarly with accuracies of</a:t>
+            </a:r>
+            <a:r>
+              <a:rPr lang="en-US" sz="2200" b="1" dirty="0"/>
               <a:t>0.62</a:t>
             </a:r>
             <a:r>
-              <a:rPr lang="en-US" sz="2000" b="1" dirty="0"/>
-              <a:t> </a:t>
-            </a:r>
-            <a:r>
-              <a:rPr lang="en-US" sz="2000" dirty="0"/>
-              <a:t>and </a:t>
-            </a:r>
-            <a:r>
-              <a:rPr lang="en-US" sz="2000" b="1" dirty="0"/>
-              <a:t>0.62</a:t>
-            </a:r>
-            <a:r>
-              <a:rPr lang="en-US" sz="2000" dirty="0"/>
+              <a:rPr lang="en-US" sz="2200" dirty="0"/>
               <a:t>, respectively.</a:t>
             </a:r>
           </a:p>
@@ -17032,6 +17008,55 @@
               <a:t>CC BY</a:t>
             </a:r>
             <a:endParaRPr lang="en-KE" sz="900"/>
+          </a:p>
+        </p:txBody>
+      </p:sp>
+      <p:sp>
+        <p:nvSpPr>
+          <p:cNvPr id="8" name="Rectangle 7">
+            <a:extLst>
+              <a:ext uri="{FF2B5EF4-FFF2-40B4-BE49-F238E27FC236}">
+                <a16:creationId xmlns:a16="http://schemas.microsoft.com/office/drawing/2014/main" id="{54B0E6C6-FF3D-4166-AA0E-161820D1589B}"/>
+              </a:ext>
+            </a:extLst>
+          </p:cNvPr>
+          <p:cNvSpPr/>
+          <p:nvPr/>
+        </p:nvSpPr>
+        <p:spPr>
+          <a:xfrm>
+            <a:off x="11146971" y="209028"/>
+            <a:ext cx="740227" cy="560993"/>
+          </a:xfrm>
+          <a:prstGeom prst="rect">
+            <a:avLst/>
+          </a:prstGeom>
+          <a:ln>
+            <a:noFill/>
+          </a:ln>
+        </p:spPr>
+        <p:style>
+          <a:lnRef idx="2">
+            <a:schemeClr val="accent1">
+              <a:shade val="50000"/>
+            </a:schemeClr>
+          </a:lnRef>
+          <a:fillRef idx="1">
+            <a:schemeClr val="accent1"/>
+          </a:fillRef>
+          <a:effectRef idx="0">
+            <a:schemeClr val="accent1"/>
+          </a:effectRef>
+          <a:fontRef idx="minor">
+            <a:schemeClr val="lt1"/>
+          </a:fontRef>
+        </p:style>
+        <p:txBody>
+          <a:bodyPr rtlCol="0" anchor="ctr"/>
+          <a:lstStyle/>
+          <a:p>
+            <a:pPr algn="ctr"/>
+            <a:endParaRPr lang="en-KE"/>
           </a:p>
         </p:txBody>
       </p:sp>
@@ -21375,6 +21400,14 @@
 </file>
 
 <file path=customXml/item1.xml><?xml version="1.0" encoding="utf-8"?>
+<p:properties xmlns:p="http://schemas.microsoft.com/office/2006/metadata/properties" xmlns:xsi="http://www.w3.org/2001/XMLSchema-instance" xmlns:pc="http://schemas.microsoft.com/office/infopath/2007/PartnerControls">
+  <documentManagement>
+    <MediaServiceKeyPoints xmlns="71af3243-3dd4-4a8d-8c0d-dd76da1f02a5" xsi:nil="true"/>
+  </documentManagement>
+</p:properties>
+</file>
+
+<file path=customXml/item2.xml><?xml version="1.0" encoding="utf-8"?>
 <ct:contentTypeSchema xmlns:ct="http://schemas.microsoft.com/office/2006/metadata/contentType" xmlns:ma="http://schemas.microsoft.com/office/2006/metadata/properties/metaAttributes" ct:_="" ma:_="" ma:contentTypeName="Document" ma:contentTypeID="0x01010079F111ED35F8CC479449609E8A0923A6" ma:contentTypeVersion="11" ma:contentTypeDescription="Create a new document." ma:contentTypeScope="" ma:versionID="96291512c1ee715ab617f4c07df79fc1">
   <xsd:schema xmlns:xsd="http://www.w3.org/2001/XMLSchema" xmlns:xs="http://www.w3.org/2001/XMLSchema" xmlns:p="http://schemas.microsoft.com/office/2006/metadata/properties" xmlns:ns2="71af3243-3dd4-4a8d-8c0d-dd76da1f02a5" xmlns:ns3="16c05727-aa75-4e4a-9b5f-8a80a1165891" targetNamespace="http://schemas.microsoft.com/office/2006/metadata/properties" ma:root="true" ma:fieldsID="8256c27c40ca5c40ce1cf6c44f0205df" ns2:_="" ns3:_="">
     <xsd:import namespace="71af3243-3dd4-4a8d-8c0d-dd76da1f02a5"/>
@@ -21585,14 +21618,6 @@
 </ct:contentTypeSchema>
 </file>
 
-<file path=customXml/item2.xml><?xml version="1.0" encoding="utf-8"?>
-<p:properties xmlns:p="http://schemas.microsoft.com/office/2006/metadata/properties" xmlns:xsi="http://www.w3.org/2001/XMLSchema-instance" xmlns:pc="http://schemas.microsoft.com/office/infopath/2007/PartnerControls">
-  <documentManagement>
-    <MediaServiceKeyPoints xmlns="71af3243-3dd4-4a8d-8c0d-dd76da1f02a5" xsi:nil="true"/>
-  </documentManagement>
-</p:properties>
-</file>
-
 <file path=customXml/item3.xml><?xml version="1.0" encoding="utf-8"?>
 <?mso-contentType ?>
 <FormTemplates xmlns="http://schemas.microsoft.com/sharepoint/v3/contenttype/forms">
@@ -21603,6 +21628,23 @@
 </file>
 
 <file path=customXml/itemProps1.xml><?xml version="1.0" encoding="utf-8"?>
+<ds:datastoreItem xmlns:ds="http://schemas.openxmlformats.org/officeDocument/2006/customXml" ds:itemID="{2940343A-75DB-4E03-95EA-4A75BA0D7FF2}">
+  <ds:schemaRefs>
+    <ds:schemaRef ds:uri="http://schemas.microsoft.com/office/2006/documentManagement/types"/>
+    <ds:schemaRef ds:uri="http://schemas.microsoft.com/office/infopath/2007/PartnerControls"/>
+    <ds:schemaRef ds:uri="http://purl.org/dc/dcmitype/"/>
+    <ds:schemaRef ds:uri="http://purl.org/dc/elements/1.1/"/>
+    <ds:schemaRef ds:uri="http://schemas.microsoft.com/office/2006/metadata/properties"/>
+    <ds:schemaRef ds:uri="16c05727-aa75-4e4a-9b5f-8a80a1165891"/>
+    <ds:schemaRef ds:uri="http://www.w3.org/XML/1998/namespace"/>
+    <ds:schemaRef ds:uri="http://schemas.openxmlformats.org/package/2006/metadata/core-properties"/>
+    <ds:schemaRef ds:uri="71af3243-3dd4-4a8d-8c0d-dd76da1f02a5"/>
+    <ds:schemaRef ds:uri="http://purl.org/dc/terms/"/>
+  </ds:schemaRefs>
+</ds:datastoreItem>
+</file>
+
+<file path=customXml/itemProps2.xml><?xml version="1.0" encoding="utf-8"?>
 <ds:datastoreItem xmlns:ds="http://schemas.openxmlformats.org/officeDocument/2006/customXml" ds:itemID="{C9C3589D-EF2D-4AF3-8B55-088F4B14D6E1}">
   <ds:schemaRefs>
     <ds:schemaRef ds:uri="http://schemas.microsoft.com/office/2006/metadata/contentType"/>
@@ -21621,23 +21663,6 @@
 </ds:datastoreItem>
 </file>
 
-<file path=customXml/itemProps2.xml><?xml version="1.0" encoding="utf-8"?>
-<ds:datastoreItem xmlns:ds="http://schemas.openxmlformats.org/officeDocument/2006/customXml" ds:itemID="{2940343A-75DB-4E03-95EA-4A75BA0D7FF2}">
-  <ds:schemaRefs>
-    <ds:schemaRef ds:uri="http://purl.org/dc/elements/1.1/"/>
-    <ds:schemaRef ds:uri="http://schemas.microsoft.com/office/2006/documentManagement/types"/>
-    <ds:schemaRef ds:uri="http://schemas.openxmlformats.org/package/2006/metadata/core-properties"/>
-    <ds:schemaRef ds:uri="http://schemas.microsoft.com/office/infopath/2007/PartnerControls"/>
-    <ds:schemaRef ds:uri="http://purl.org/dc/dcmitype/"/>
-    <ds:schemaRef ds:uri="71af3243-3dd4-4a8d-8c0d-dd76da1f02a5"/>
-    <ds:schemaRef ds:uri="http://purl.org/dc/terms/"/>
-    <ds:schemaRef ds:uri="16c05727-aa75-4e4a-9b5f-8a80a1165891"/>
-    <ds:schemaRef ds:uri="http://schemas.microsoft.com/office/2006/metadata/properties"/>
-    <ds:schemaRef ds:uri="http://www.w3.org/XML/1998/namespace"/>
-  </ds:schemaRefs>
-</ds:datastoreItem>
-</file>
-
 <file path=customXml/itemProps3.xml><?xml version="1.0" encoding="utf-8"?>
 <ds:datastoreItem xmlns:ds="http://schemas.openxmlformats.org/officeDocument/2006/customXml" ds:itemID="{AB759597-1FA4-4F46-9BA8-01240C56026E}">
   <ds:schemaRefs>

</xml_diff>